<commit_message>
Comentario e Slides finais
</commit_message>
<xml_diff>
--- a/Apresentação - Sistemas Operacionais.pptx
+++ b/Apresentação - Sistemas Operacionais.pptx
@@ -6,15 +6,12 @@
   </p:sldMasterIdLst>
   <p:sldIdLst>
     <p:sldId id="256" r:id="rId2"/>
-    <p:sldId id="257" r:id="rId3"/>
-    <p:sldId id="258" r:id="rId4"/>
-    <p:sldId id="259" r:id="rId5"/>
-    <p:sldId id="260" r:id="rId6"/>
-    <p:sldId id="261" r:id="rId7"/>
-    <p:sldId id="262" r:id="rId8"/>
-    <p:sldId id="263" r:id="rId9"/>
-    <p:sldId id="264" r:id="rId10"/>
-    <p:sldId id="265" r:id="rId11"/>
+    <p:sldId id="264" r:id="rId3"/>
+    <p:sldId id="257" r:id="rId4"/>
+    <p:sldId id="258" r:id="rId5"/>
+    <p:sldId id="259" r:id="rId6"/>
+    <p:sldId id="263" r:id="rId7"/>
+    <p:sldId id="265" r:id="rId8"/>
   </p:sldIdLst>
   <p:sldSz cx="12192000" cy="6858000"/>
   <p:notesSz cx="6858000" cy="9144000"/>
@@ -126,6 +123,7 @@
   <p1510:revLst>
     <p1510:client id="{0A4AF2E1-854F-459A-B8BB-90092FBF7666}" v="1424" dt="2020-10-13T20:40:26.124"/>
     <p1510:client id="{1DD03622-5841-4DEF-A048-B187CF2910BD}" v="1098" dt="2020-12-06T04:35:35.758"/>
+    <p1510:client id="{E90542DB-F4BA-405E-B48D-394BFAB61A37}" v="591" dt="2020-12-06T17:23:54.197"/>
   </p1510:revLst>
 </p1510:revInfo>
 </file>
@@ -281,7 +279,7 @@
           <a:p>
             <a:fld id="{23FEA57E-7C1A-457B-A4CD-5DCEB057B502}" type="datetime1">
               <a:rPr lang="en-US" smtClean="0"/>
-              <a:t>12/5/2020</a:t>
+              <a:t>12/6/2020</a:t>
             </a:fld>
             <a:endParaRPr lang="en-US" dirty="0"/>
           </a:p>
@@ -484,7 +482,7 @@
           <a:p>
             <a:fld id="{11789749-A4CD-447F-8298-2B7988C91CEA}" type="datetime1">
               <a:rPr lang="en-US" smtClean="0"/>
-              <a:t>12/5/2020</a:t>
+              <a:t>12/6/2020</a:t>
             </a:fld>
             <a:endParaRPr lang="en-US"/>
           </a:p>
@@ -695,7 +693,7 @@
           <a:p>
             <a:fld id="{BA0444D3-C0BA-4587-A56C-581AB9F841BE}" type="datetime1">
               <a:rPr lang="en-US" smtClean="0"/>
-              <a:t>12/5/2020</a:t>
+              <a:t>12/6/2020</a:t>
             </a:fld>
             <a:endParaRPr lang="en-US"/>
           </a:p>
@@ -909,7 +907,7 @@
           <a:p>
             <a:fld id="{201AF2CE-4F37-411C-A3EE-BBBE223265BF}" type="datetime1">
               <a:rPr lang="en-US" smtClean="0"/>
-              <a:t>12/5/2020</a:t>
+              <a:t>12/6/2020</a:t>
             </a:fld>
             <a:endParaRPr lang="en-US"/>
           </a:p>
@@ -1190,7 +1188,7 @@
           <a:p>
             <a:fld id="{C96083D4-708C-4BB5-B4FD-30CE9FA12FD5}" type="datetime1">
               <a:rPr lang="en-US" smtClean="0"/>
-              <a:t>12/5/2020</a:t>
+              <a:t>12/6/2020</a:t>
             </a:fld>
             <a:endParaRPr lang="en-US"/>
           </a:p>
@@ -1470,7 +1468,7 @@
           <a:p>
             <a:fld id="{D0D239B2-65BC-4C2A-A62B-3EABFE9590E4}" type="datetime1">
               <a:rPr lang="en-US" smtClean="0"/>
-              <a:t>12/5/2020</a:t>
+              <a:t>12/6/2020</a:t>
             </a:fld>
             <a:endParaRPr lang="en-US"/>
           </a:p>
@@ -1892,7 +1890,7 @@
           <a:p>
             <a:fld id="{85E05F5A-E4A3-476F-A89E-C2B73F2431E4}" type="datetime1">
               <a:rPr lang="en-US" smtClean="0"/>
-              <a:t>12/5/2020</a:t>
+              <a:t>12/6/2020</a:t>
             </a:fld>
             <a:endParaRPr lang="en-US"/>
           </a:p>
@@ -2037,7 +2035,7 @@
           <a:p>
             <a:fld id="{E3761515-4A26-4F31-9F61-5A10B1FABBFC}" type="datetime1">
               <a:rPr lang="en-US" smtClean="0"/>
-              <a:t>12/5/2020</a:t>
+              <a:t>12/6/2020</a:t>
             </a:fld>
             <a:endParaRPr lang="en-US"/>
           </a:p>
@@ -2153,7 +2151,7 @@
           <a:p>
             <a:fld id="{4A75DC65-7D1F-4BAB-9695-F7E734143E14}" type="datetime1">
               <a:rPr lang="en-US" smtClean="0"/>
-              <a:t>12/5/2020</a:t>
+              <a:t>12/6/2020</a:t>
             </a:fld>
             <a:endParaRPr lang="en-US"/>
           </a:p>
@@ -2467,7 +2465,7 @@
           <a:p>
             <a:fld id="{7E624077-BD55-4036-8E92-6558FDF3B653}" type="datetime1">
               <a:rPr lang="en-US" smtClean="0"/>
-              <a:t>12/5/2020</a:t>
+              <a:t>12/6/2020</a:t>
             </a:fld>
             <a:endParaRPr lang="en-US"/>
           </a:p>
@@ -2761,7 +2759,7 @@
           <a:p>
             <a:fld id="{804225F2-7107-4609-BCC2-77C63064A5E8}" type="datetime1">
               <a:rPr lang="en-US" smtClean="0"/>
-              <a:t>12/5/2020</a:t>
+              <a:t>12/6/2020</a:t>
             </a:fld>
             <a:endParaRPr lang="en-US"/>
           </a:p>
@@ -3009,7 +3007,7 @@
           <a:p>
             <a:fld id="{D3FE42E8-8B57-452D-A122-4DCE9AC771EF}" type="datetime1">
               <a:rPr lang="en-US" smtClean="0"/>
-              <a:t>12/5/2020</a:t>
+              <a:t>12/6/2020</a:t>
             </a:fld>
             <a:endParaRPr lang="en-US"/>
           </a:p>
@@ -3673,7 +3671,7 @@
           <a:lstStyle/>
           <a:p>
             <a:r>
-              <a:rPr lang="de-DE" sz="4000" dirty="0"/>
+              <a:rPr lang="de-DE" sz="4000" b="1" dirty="0"/>
               <a:t>PROJETO 2 DE SISTEMAS OPERACIONAIS</a:t>
             </a:r>
           </a:p>
@@ -3743,7 +3741,7 @@
 </p:sld>
 </file>
 
-<file path=ppt/slides/slide10.xml><?xml version="1.0" encoding="utf-8"?>
+<file path=ppt/slides/slide2.xml><?xml version="1.0" encoding="utf-8"?>
 <p:sld xmlns:a="http://schemas.openxmlformats.org/drawingml/2006/main" xmlns:r="http://schemas.openxmlformats.org/officeDocument/2006/relationships" xmlns:p="http://schemas.openxmlformats.org/presentationml/2006/main">
   <p:cSld>
     <p:bg>
@@ -3993,21 +3991,21 @@
           <a:lstStyle/>
           <a:p>
             <a:r>
-              <a:rPr lang="de-DE" sz="4000" dirty="0" err="1"/>
+              <a:rPr lang="de-DE" sz="4000" b="1" dirty="0" err="1"/>
               <a:t>Diagrama</a:t>
             </a:r>
             <a:r>
-              <a:rPr lang="de-DE" sz="4000" dirty="0"/>
+              <a:rPr lang="de-DE" sz="4000" b="1" dirty="0"/>
               <a:t> de </a:t>
             </a:r>
             <a:r>
-              <a:rPr lang="de-DE" sz="4000" dirty="0" err="1"/>
-              <a:t>Atividade</a:t>
+              <a:rPr lang="de-DE" sz="4000" b="1" dirty="0" err="1"/>
+              <a:t>classe</a:t>
             </a:r>
             <a:br>
-              <a:rPr lang="de-DE" sz="4000" dirty="0"/>
+              <a:rPr lang="de-DE" sz="4000" b="1" dirty="0"/>
             </a:br>
-            <a:endParaRPr lang="pt-BR" dirty="0" err="1"/>
+            <a:endParaRPr lang="pt-BR" b="1"/>
           </a:p>
         </p:txBody>
       </p:sp>
@@ -4040,10 +4038,10 @@
       </p:sp>
       <p:pic>
         <p:nvPicPr>
-          <p:cNvPr id="4" name="Imagem 5" descr="Diagrama&#10;&#10;Descrição gerada automaticamente">
-            <a:extLst>
-              <a:ext uri="{FF2B5EF4-FFF2-40B4-BE49-F238E27FC236}">
-                <a16:creationId xmlns:a16="http://schemas.microsoft.com/office/drawing/2014/main" id="{8444D186-79B3-46E7-B778-ED964A93FB02}"/>
+          <p:cNvPr id="5" name="Imagem 5" descr="Diagrama&#10;&#10;Descrição gerada automaticamente">
+            <a:extLst>
+              <a:ext uri="{FF2B5EF4-FFF2-40B4-BE49-F238E27FC236}">
+                <a16:creationId xmlns:a16="http://schemas.microsoft.com/office/drawing/2014/main" id="{D8244E16-FD28-4828-ACCE-7DDB871C4D6C}"/>
               </a:ext>
             </a:extLst>
           </p:cNvPr>
@@ -4060,8 +4058,8 @@
         </p:blipFill>
         <p:spPr>
           <a:xfrm>
-            <a:off x="3022948" y="1381740"/>
-            <a:ext cx="6146103" cy="4699944"/>
+            <a:off x="4275551" y="1436288"/>
+            <a:ext cx="3891418" cy="4590848"/>
           </a:xfrm>
           <a:prstGeom prst="rect">
             <a:avLst/>
@@ -4071,7 +4069,7 @@
     </p:spTree>
     <p:extLst>
       <p:ext uri="{BB962C8B-B14F-4D97-AF65-F5344CB8AC3E}">
-        <p14:creationId xmlns:p14="http://schemas.microsoft.com/office/powerpoint/2010/main" val="2032202397"/>
+        <p14:creationId xmlns:p14="http://schemas.microsoft.com/office/powerpoint/2010/main" val="2450273134"/>
       </p:ext>
     </p:extLst>
   </p:cSld>
@@ -4081,7 +4079,7 @@
 </p:sld>
 </file>
 
-<file path=ppt/slides/slide2.xml><?xml version="1.0" encoding="utf-8"?>
+<file path=ppt/slides/slide3.xml><?xml version="1.0" encoding="utf-8"?>
 <p:sld xmlns:a="http://schemas.openxmlformats.org/drawingml/2006/main" xmlns:r="http://schemas.openxmlformats.org/officeDocument/2006/relationships" xmlns:p="http://schemas.openxmlformats.org/presentationml/2006/main">
   <p:cSld>
     <p:bg>
@@ -4331,17 +4329,17 @@
           <a:lstStyle/>
           <a:p>
             <a:r>
-              <a:rPr lang="de-DE" sz="4000" dirty="0"/>
+              <a:rPr lang="de-DE" sz="4000" b="1" dirty="0"/>
               <a:t>Classes </a:t>
             </a:r>
             <a:r>
-              <a:rPr lang="de-DE" sz="4000" dirty="0" err="1"/>
+              <a:rPr lang="de-DE" sz="4000" b="1" dirty="0" err="1"/>
               <a:t>utilizadas</a:t>
             </a:r>
             <a:br>
-              <a:rPr lang="de-DE" sz="4000" dirty="0"/>
+              <a:rPr lang="de-DE" sz="4000" b="1" dirty="0"/>
             </a:br>
-            <a:endParaRPr lang="de-DE" sz="4000" dirty="0"/>
+            <a:endParaRPr lang="de-DE" sz="4000" b="1" dirty="0"/>
           </a:p>
         </p:txBody>
       </p:sp>
@@ -4517,7 +4515,7 @@
 </p:sld>
 </file>
 
-<file path=ppt/slides/slide3.xml><?xml version="1.0" encoding="utf-8"?>
+<file path=ppt/slides/slide4.xml><?xml version="1.0" encoding="utf-8"?>
 <p:sld xmlns:a="http://schemas.openxmlformats.org/drawingml/2006/main" xmlns:r="http://schemas.openxmlformats.org/officeDocument/2006/relationships" xmlns:p="http://schemas.openxmlformats.org/presentationml/2006/main">
   <p:cSld>
     <p:bg>
@@ -4767,9 +4765,10 @@
           <a:lstStyle/>
           <a:p>
             <a:r>
-              <a:rPr lang="de-DE" sz="4000" dirty="0" err="1"/>
+              <a:rPr lang="de-DE" sz="4000" b="1" dirty="0" err="1"/>
               <a:t>Computador</a:t>
             </a:r>
+            <a:endParaRPr lang="de-DE" sz="4000" b="1"/>
           </a:p>
         </p:txBody>
       </p:sp>
@@ -4890,7 +4889,7 @@
 </p:sld>
 </file>
 
-<file path=ppt/slides/slide4.xml><?xml version="1.0" encoding="utf-8"?>
+<file path=ppt/slides/slide5.xml><?xml version="1.0" encoding="utf-8"?>
 <p:sld xmlns:a="http://schemas.openxmlformats.org/drawingml/2006/main" xmlns:r="http://schemas.openxmlformats.org/officeDocument/2006/relationships" xmlns:p="http://schemas.openxmlformats.org/presentationml/2006/main">
   <p:cSld>
     <p:bg>
@@ -5140,9 +5139,10 @@
           <a:lstStyle/>
           <a:p>
             <a:r>
-              <a:rPr lang="de-DE" sz="4000" dirty="0" err="1"/>
-              <a:t>Componente</a:t>
-            </a:r>
+              <a:rPr lang="de-DE" sz="4000" b="1" dirty="0" err="1"/>
+              <a:t>Componentes</a:t>
+            </a:r>
+            <a:endParaRPr lang="de-DE" sz="4000" b="1" dirty="0"/>
           </a:p>
         </p:txBody>
       </p:sp>
@@ -5158,8 +5158,8 @@
         </p:nvSpPr>
         <p:spPr>
           <a:xfrm>
-            <a:off x="2039819" y="2416565"/>
-            <a:ext cx="8115300" cy="2588445"/>
+            <a:off x="2039819" y="2186921"/>
+            <a:ext cx="8115300" cy="3767980"/>
           </a:xfrm>
         </p:spPr>
         <p:txBody>
@@ -5173,13 +5173,98 @@
               <a:buChar char="•"/>
             </a:pPr>
             <a:r>
-              <a:rPr lang="de-DE" sz="2800" i="0" dirty="0"/>
-              <a:t>Classe </a:t>
-            </a:r>
-            <a:r>
-              <a:rPr lang="de-DE" sz="2800" i="0" dirty="0" err="1"/>
-              <a:t>abstrata</a:t>
-            </a:r>
+              <a:rPr lang="de-DE" sz="2800" b="1" i="0" dirty="0"/>
+              <a:t>Disco</a:t>
+            </a:r>
+            <a:r>
+              <a:rPr lang="de-DE" sz="2800" i="0" dirty="0"/>
+              <a:t>: Classe </a:t>
+            </a:r>
+            <a:r>
+              <a:rPr lang="de-DE" sz="2800" i="0" dirty="0" err="1"/>
+              <a:t>que</a:t>
+            </a:r>
+            <a:r>
+              <a:rPr lang="de-DE" sz="2800" i="0" dirty="0"/>
+              <a:t> </a:t>
+            </a:r>
+            <a:r>
+              <a:rPr lang="de-DE" sz="2800" i="0" dirty="0" err="1"/>
+              <a:t>simula</a:t>
+            </a:r>
+            <a:r>
+              <a:rPr lang="de-DE" sz="2800" i="0" dirty="0"/>
+              <a:t> o </a:t>
+            </a:r>
+            <a:r>
+              <a:rPr lang="de-DE" sz="2800" i="0" dirty="0" err="1"/>
+              <a:t>funcionamento</a:t>
+            </a:r>
+            <a:r>
+              <a:rPr lang="de-DE" sz="2800" i="0" dirty="0"/>
+              <a:t> de um </a:t>
+            </a:r>
+            <a:r>
+              <a:rPr lang="de-DE" sz="2800" i="0" dirty="0" err="1"/>
+              <a:t>disco</a:t>
+            </a:r>
+            <a:r>
+              <a:rPr lang="de-DE" sz="2800" i="0" dirty="0"/>
+              <a:t>, </a:t>
+            </a:r>
+            <a:r>
+              <a:rPr lang="de-DE" sz="2800" i="0" dirty="0" err="1"/>
+              <a:t>sendo</a:t>
+            </a:r>
+            <a:r>
+              <a:rPr lang="de-DE" sz="2800" i="0" dirty="0"/>
+              <a:t> </a:t>
+            </a:r>
+            <a:r>
+              <a:rPr lang="de-DE" sz="2800" i="0" dirty="0" err="1"/>
+              <a:t>responsável</a:t>
+            </a:r>
+            <a:r>
+              <a:rPr lang="de-DE" sz="2800" i="0" dirty="0"/>
+              <a:t> </a:t>
+            </a:r>
+            <a:r>
+              <a:rPr lang="de-DE" sz="2800" i="0" dirty="0" err="1"/>
+              <a:t>por</a:t>
+            </a:r>
+            <a:r>
+              <a:rPr lang="de-DE" sz="2800" i="0" dirty="0"/>
+              <a:t> </a:t>
+            </a:r>
+            <a:r>
+              <a:rPr lang="de-DE" sz="2800" i="0" dirty="0" err="1"/>
+              <a:t>criar</a:t>
+            </a:r>
+            <a:r>
+              <a:rPr lang="de-DE" sz="2800" i="0" dirty="0"/>
+              <a:t> e </a:t>
+            </a:r>
+            <a:r>
+              <a:rPr lang="de-DE" sz="2800" i="0" dirty="0" err="1"/>
+              <a:t>manter</a:t>
+            </a:r>
+            <a:r>
+              <a:rPr lang="de-DE" sz="2800" i="0" dirty="0"/>
+              <a:t> a </a:t>
+            </a:r>
+            <a:r>
+              <a:rPr lang="de-DE" sz="2800" i="0" dirty="0" err="1"/>
+              <a:t>pasta</a:t>
+            </a:r>
+            <a:r>
+              <a:rPr lang="de-DE" sz="2800" i="0" dirty="0"/>
+              <a:t> de </a:t>
+            </a:r>
+            <a:r>
+              <a:rPr lang="de-DE" sz="2800" i="0" dirty="0" err="1"/>
+              <a:t>backup</a:t>
+            </a:r>
+            <a:endParaRPr lang="de-DE" sz="2800" i="0" dirty="0"/>
           </a:p>
           <a:p>
             <a:pPr marL="457200" indent="-457200" algn="l">
@@ -5187,8 +5272,16 @@
               <a:buChar char="•"/>
             </a:pPr>
             <a:r>
-              <a:rPr lang="de-DE" sz="2800" i="0" dirty="0" err="1"/>
-              <a:t>Serve</a:t>
+              <a:rPr lang="de-DE" sz="2800" b="1" i="0" dirty="0" err="1"/>
+              <a:t>Processador</a:t>
+            </a:r>
+            <a:r>
+              <a:rPr lang="de-DE" sz="2800" i="0" dirty="0"/>
+              <a:t>: Classe </a:t>
+            </a:r>
+            <a:r>
+              <a:rPr lang="de-DE" sz="2800" i="0" dirty="0" err="1"/>
+              <a:t>que</a:t>
             </a:r>
             <a:r>
               <a:rPr lang="de-DE" sz="2800" i="0" dirty="0"/>
@@ -5196,7 +5289,31 @@
             </a:r>
             <a:r>
               <a:rPr lang="de-DE" sz="2800" i="0" dirty="0" err="1"/>
-              <a:t>como</a:t>
+              <a:t>simula</a:t>
+            </a:r>
+            <a:r>
+              <a:rPr lang="de-DE" sz="2800" i="0" dirty="0"/>
+              <a:t> o </a:t>
+            </a:r>
+            <a:r>
+              <a:rPr lang="de-DE" sz="2800" i="0" dirty="0" err="1"/>
+              <a:t>funcionamento</a:t>
+            </a:r>
+            <a:r>
+              <a:rPr lang="de-DE" sz="2800" i="0" dirty="0"/>
+              <a:t> de um </a:t>
+            </a:r>
+            <a:r>
+              <a:rPr lang="de-DE" sz="2800" i="0" dirty="0" err="1"/>
+              <a:t>processador</a:t>
+            </a:r>
+            <a:r>
+              <a:rPr lang="de-DE" sz="2800" i="0" dirty="0"/>
+              <a:t>, </a:t>
+            </a:r>
+            <a:r>
+              <a:rPr lang="de-DE" sz="2800" i="0" dirty="0" err="1"/>
+              <a:t>sendo</a:t>
             </a:r>
             <a:r>
               <a:rPr lang="de-DE" sz="2800" i="0" dirty="0"/>
@@ -5204,7 +5321,7 @@
             </a:r>
             <a:r>
               <a:rPr lang="de-DE" sz="2800" i="0" dirty="0" err="1"/>
-              <a:t>base</a:t>
+              <a:t>responsável</a:t>
             </a:r>
             <a:r>
               <a:rPr lang="de-DE" sz="2800" i="0" dirty="0"/>
@@ -5212,7 +5329,7 @@
             </a:r>
             <a:r>
               <a:rPr lang="de-DE" sz="2800" i="0" dirty="0" err="1"/>
-              <a:t>para</a:t>
+              <a:t>pelas</a:t>
             </a:r>
             <a:r>
               <a:rPr lang="de-DE" sz="2800" i="0" dirty="0"/>
@@ -5220,7 +5337,26 @@
             </a:r>
             <a:r>
               <a:rPr lang="de-DE" sz="2800" i="0" dirty="0" err="1"/>
-              <a:t>os</a:t>
+              <a:t>instruções</a:t>
+            </a:r>
+            <a:endParaRPr lang="de-DE" sz="2800" i="0"/>
+          </a:p>
+          <a:p>
+            <a:pPr marL="457200" indent="-457200" algn="l">
+              <a:buFont typeface="Arial"/>
+              <a:buChar char="•"/>
+            </a:pPr>
+            <a:r>
+              <a:rPr lang="de-DE" sz="2800" b="1" i="0" dirty="0" err="1"/>
+              <a:t>Teclado</a:t>
+            </a:r>
+            <a:r>
+              <a:rPr lang="de-DE" sz="2800" i="0" dirty="0"/>
+              <a:t>: Classe </a:t>
+            </a:r>
+            <a:r>
+              <a:rPr lang="de-DE" sz="2800" i="0" dirty="0" err="1"/>
+              <a:t>que</a:t>
             </a:r>
             <a:r>
               <a:rPr lang="de-DE" sz="2800" i="0" dirty="0"/>
@@ -5228,7 +5364,31 @@
             </a:r>
             <a:r>
               <a:rPr lang="de-DE" sz="2800" i="0" dirty="0" err="1"/>
-              <a:t>outros</a:t>
+              <a:t>simula</a:t>
+            </a:r>
+            <a:r>
+              <a:rPr lang="de-DE" sz="2800" i="0" dirty="0"/>
+              <a:t> o </a:t>
+            </a:r>
+            <a:r>
+              <a:rPr lang="de-DE" sz="2800" i="0" dirty="0" err="1"/>
+              <a:t>funcionamento</a:t>
+            </a:r>
+            <a:r>
+              <a:rPr lang="de-DE" sz="2800" i="0" dirty="0"/>
+              <a:t> de um </a:t>
+            </a:r>
+            <a:r>
+              <a:rPr lang="de-DE" sz="2800" i="0" dirty="0" err="1"/>
+              <a:t>teclado</a:t>
+            </a:r>
+            <a:r>
+              <a:rPr lang="de-DE" sz="2800" i="0" dirty="0"/>
+              <a:t>, </a:t>
+            </a:r>
+            <a:r>
+              <a:rPr lang="de-DE" sz="2800" i="0" dirty="0" err="1"/>
+              <a:t>sendo</a:t>
             </a:r>
             <a:r>
               <a:rPr lang="de-DE" sz="2800" i="0" dirty="0"/>
@@ -5236,36 +5396,57 @@
             </a:r>
             <a:r>
               <a:rPr lang="de-DE" sz="2800" i="0" dirty="0" err="1"/>
-              <a:t>componentes</a:t>
-            </a:r>
-            <a:r>
-              <a:rPr lang="de-DE" sz="2800" i="0" dirty="0"/>
-              <a:t> (</a:t>
-            </a:r>
-            <a:r>
-              <a:rPr lang="de-DE" sz="2800" i="0" dirty="0" err="1"/>
-              <a:t>disco</a:t>
-            </a:r>
-            <a:r>
-              <a:rPr lang="de-DE" sz="2800" i="0" dirty="0"/>
-              <a:t>, </a:t>
-            </a:r>
-            <a:r>
-              <a:rPr lang="de-DE" sz="2800" i="0" dirty="0" err="1"/>
-              <a:t>processador</a:t>
-            </a:r>
-            <a:r>
-              <a:rPr lang="de-DE" sz="2800" i="0" dirty="0"/>
-              <a:t> e </a:t>
-            </a:r>
-            <a:r>
-              <a:rPr lang="de-DE" sz="2800" i="0" dirty="0" err="1"/>
-              <a:t>teclado</a:t>
-            </a:r>
-            <a:r>
-              <a:rPr lang="de-DE" sz="2800" i="0" dirty="0"/>
-              <a:t>)</a:t>
-            </a:r>
+              <a:t>responsável</a:t>
+            </a:r>
+            <a:r>
+              <a:rPr lang="de-DE" sz="2800" i="0" dirty="0"/>
+              <a:t> </a:t>
+            </a:r>
+            <a:r>
+              <a:rPr lang="de-DE" sz="2800" i="0" dirty="0" err="1"/>
+              <a:t>por</a:t>
+            </a:r>
+            <a:r>
+              <a:rPr lang="de-DE" sz="2800" i="0" dirty="0"/>
+              <a:t> </a:t>
+            </a:r>
+            <a:r>
+              <a:rPr lang="de-DE" sz="2800" i="0" dirty="0" err="1"/>
+              <a:t>ler</a:t>
+            </a:r>
+            <a:r>
+              <a:rPr lang="de-DE" sz="2800" i="0" dirty="0"/>
+              <a:t> </a:t>
+            </a:r>
+            <a:r>
+              <a:rPr lang="de-DE" sz="2800" i="0" dirty="0" err="1"/>
+              <a:t>mensagens</a:t>
+            </a:r>
+            <a:r>
+              <a:rPr lang="de-DE" sz="2800" i="0" dirty="0"/>
+              <a:t> </a:t>
+            </a:r>
+            <a:r>
+              <a:rPr lang="de-DE" sz="2800" i="0" dirty="0" err="1"/>
+              <a:t>feitas</a:t>
+            </a:r>
+            <a:r>
+              <a:rPr lang="de-DE" sz="2800" i="0" dirty="0"/>
+              <a:t> </a:t>
+            </a:r>
+            <a:r>
+              <a:rPr lang="de-DE" sz="2800" i="0" dirty="0" err="1"/>
+              <a:t>pelo</a:t>
+            </a:r>
+            <a:r>
+              <a:rPr lang="de-DE" sz="2800" i="0" dirty="0"/>
+              <a:t> </a:t>
+            </a:r>
+            <a:r>
+              <a:rPr lang="de-DE" sz="2800" i="0" dirty="0" err="1"/>
+              <a:t>usuário</a:t>
+            </a:r>
+            <a:endParaRPr lang="de-DE" sz="2800" i="0"/>
           </a:p>
           <a:p>
             <a:pPr marL="457200" indent="-457200" algn="l">
@@ -5289,7 +5470,7 @@
 </p:sld>
 </file>
 
-<file path=ppt/slides/slide5.xml><?xml version="1.0" encoding="utf-8"?>
+<file path=ppt/slides/slide6.xml><?xml version="1.0" encoding="utf-8"?>
 <p:sld xmlns:a="http://schemas.openxmlformats.org/drawingml/2006/main" xmlns:r="http://schemas.openxmlformats.org/officeDocument/2006/relationships" xmlns:p="http://schemas.openxmlformats.org/presentationml/2006/main">
   <p:cSld>
     <p:bg>
@@ -5539,9 +5720,10 @@
           <a:lstStyle/>
           <a:p>
             <a:r>
-              <a:rPr lang="de-DE" sz="4000" dirty="0"/>
-              <a:t>Disco</a:t>
-            </a:r>
+              <a:rPr lang="de-DE" sz="4000" b="1" dirty="0" err="1"/>
+              <a:t>Leitorconfig</a:t>
+            </a:r>
+            <a:endParaRPr lang="pt-BR" b="1" dirty="0" err="1"/>
           </a:p>
         </p:txBody>
       </p:sp>
@@ -5585,23 +5767,31 @@
             </a:r>
             <a:r>
               <a:rPr lang="de-DE" sz="2800" i="0" dirty="0" err="1"/>
-              <a:t>simula</a:t>
-            </a:r>
-            <a:r>
-              <a:rPr lang="de-DE" sz="2800" i="0" dirty="0"/>
-              <a:t> o </a:t>
-            </a:r>
-            <a:r>
-              <a:rPr lang="de-DE" sz="2800" i="0" dirty="0" err="1"/>
-              <a:t>funcionamento</a:t>
-            </a:r>
-            <a:r>
-              <a:rPr lang="de-DE" sz="2800" i="0" dirty="0"/>
-              <a:t> de um </a:t>
-            </a:r>
-            <a:r>
-              <a:rPr lang="de-DE" sz="2800" i="0" dirty="0" err="1"/>
-              <a:t>disco</a:t>
+              <a:t>faz</a:t>
+            </a:r>
+            <a:r>
+              <a:rPr lang="de-DE" sz="2800" i="0" dirty="0"/>
+              <a:t> a </a:t>
+            </a:r>
+            <a:r>
+              <a:rPr lang="de-DE" sz="2800" i="0" dirty="0" err="1"/>
+              <a:t>leitura</a:t>
+            </a:r>
+            <a:r>
+              <a:rPr lang="de-DE" sz="2800" i="0" dirty="0"/>
+              <a:t> do </a:t>
+            </a:r>
+            <a:r>
+              <a:rPr lang="de-DE" sz="2800" i="0" dirty="0" err="1"/>
+              <a:t>arquivo</a:t>
+            </a:r>
+            <a:r>
+              <a:rPr lang="de-DE" sz="2800" i="0" dirty="0"/>
+              <a:t> de </a:t>
+            </a:r>
+            <a:r>
+              <a:rPr lang="de-DE" sz="2800" i="0" dirty="0" err="1"/>
+              <a:t>configuração</a:t>
             </a:r>
           </a:p>
           <a:p>
@@ -5611,7 +5801,7 @@
             </a:pPr>
             <a:r>
               <a:rPr lang="de-DE" sz="2800" i="0" dirty="0" err="1"/>
-              <a:t>Responsável</a:t>
+              <a:t>Reponsável</a:t>
             </a:r>
             <a:r>
               <a:rPr lang="de-DE" sz="2800" i="0" dirty="0"/>
@@ -5619,54 +5809,39 @@
             </a:r>
             <a:r>
               <a:rPr lang="de-DE" sz="2800" i="0" dirty="0" err="1"/>
+              <a:t>também</a:t>
+            </a:r>
+            <a:r>
+              <a:rPr lang="de-DE" sz="2800" i="0" dirty="0"/>
+              <a:t> </a:t>
+            </a:r>
+            <a:r>
+              <a:rPr lang="de-DE" sz="2800" i="0" dirty="0" err="1"/>
               <a:t>por</a:t>
             </a:r>
             <a:r>
               <a:rPr lang="de-DE" sz="2800" i="0" dirty="0"/>
-              <a:t> </a:t>
-            </a:r>
-            <a:r>
-              <a:rPr lang="de-DE" sz="2800" i="0" dirty="0" err="1"/>
-              <a:t>criar</a:t>
-            </a:r>
-            <a:r>
-              <a:rPr lang="de-DE" sz="2800" i="0" dirty="0"/>
-              <a:t> e </a:t>
-            </a:r>
-            <a:r>
-              <a:rPr lang="de-DE" sz="2800" i="0" dirty="0" err="1"/>
-              <a:t>manter</a:t>
-            </a:r>
-            <a:r>
-              <a:rPr lang="de-DE" sz="2800" i="0" dirty="0"/>
-              <a:t> a </a:t>
-            </a:r>
-            <a:r>
-              <a:rPr lang="de-DE" sz="2800" i="0" dirty="0" err="1"/>
-              <a:t>pasta</a:t>
-            </a:r>
-            <a:r>
-              <a:rPr lang="de-DE" sz="2800" i="0" dirty="0"/>
-              <a:t> de </a:t>
-            </a:r>
-            <a:r>
-              <a:rPr lang="de-DE" sz="2800" i="0" dirty="0" err="1"/>
-              <a:t>backup</a:t>
-            </a:r>
-          </a:p>
-          <a:p>
-            <a:pPr marL="457200" indent="-457200" algn="l">
-              <a:buFont typeface="Arial"/>
-              <a:buChar char="•"/>
-            </a:pPr>
-            <a:endParaRPr lang="de-DE" sz="2800" i="0" dirty="0"/>
+              <a:t> </a:t>
+            </a:r>
+            <a:r>
+              <a:rPr lang="de-DE" sz="2800" i="0" dirty="0" err="1"/>
+              <a:t>montar</a:t>
+            </a:r>
+            <a:r>
+              <a:rPr lang="de-DE" sz="2800" i="0" dirty="0"/>
+              <a:t> o </a:t>
+            </a:r>
+            <a:r>
+              <a:rPr lang="de-DE" sz="2800" i="0" dirty="0" err="1"/>
+              <a:t>computador</a:t>
+            </a:r>
           </a:p>
         </p:txBody>
       </p:sp>
     </p:spTree>
     <p:extLst>
       <p:ext uri="{BB962C8B-B14F-4D97-AF65-F5344CB8AC3E}">
-        <p14:creationId xmlns:p14="http://schemas.microsoft.com/office/powerpoint/2010/main" val="4257129640"/>
+        <p14:creationId xmlns:p14="http://schemas.microsoft.com/office/powerpoint/2010/main" val="1057490945"/>
       </p:ext>
     </p:extLst>
   </p:cSld>
@@ -5676,7 +5851,7 @@
 </p:sld>
 </file>
 
-<file path=ppt/slides/slide6.xml><?xml version="1.0" encoding="utf-8"?>
+<file path=ppt/slides/slide7.xml><?xml version="1.0" encoding="utf-8"?>
 <p:sld xmlns:a="http://schemas.openxmlformats.org/drawingml/2006/main" xmlns:r="http://schemas.openxmlformats.org/officeDocument/2006/relationships" xmlns:p="http://schemas.openxmlformats.org/presentationml/2006/main">
   <p:cSld>
     <p:bg>
@@ -5926,10 +6101,18 @@
           <a:lstStyle/>
           <a:p>
             <a:r>
-              <a:rPr lang="de-DE" sz="4000" dirty="0" err="1"/>
-              <a:t>Processador</a:t>
-            </a:r>
-            <a:endParaRPr lang="pt-BR" dirty="0" err="1"/>
+              <a:rPr lang="de-DE" sz="4000" b="1" dirty="0" err="1"/>
+              <a:t>Diagrama</a:t>
+            </a:r>
+            <a:r>
+              <a:rPr lang="de-DE" sz="4000" b="1" dirty="0"/>
+              <a:t> de </a:t>
+            </a:r>
+            <a:r>
+              <a:rPr lang="de-DE" sz="4000" b="1" dirty="0" err="1"/>
+              <a:t>atividade</a:t>
+            </a:r>
+            <a:endParaRPr lang="pt-BR" b="1"/>
           </a:p>
         </p:txBody>
       </p:sp>
@@ -5961,11 +6144,11 @@
             </a:pPr>
             <a:r>
               <a:rPr lang="de-DE" sz="2800" i="0" dirty="0"/>
-              <a:t>Classe </a:t>
-            </a:r>
-            <a:r>
-              <a:rPr lang="de-DE" sz="2800" i="0" dirty="0" err="1"/>
-              <a:t>que</a:t>
+              <a:t>Para </a:t>
+            </a:r>
+            <a:r>
+              <a:rPr lang="de-DE" sz="2800" i="0" dirty="0" err="1"/>
+              <a:t>garantir</a:t>
             </a:r>
             <a:r>
               <a:rPr lang="de-DE" sz="2800" i="0" dirty="0"/>
@@ -5973,7 +6156,15 @@
             </a:r>
             <a:r>
               <a:rPr lang="de-DE" sz="2800" i="0" dirty="0" err="1"/>
-              <a:t>simula</a:t>
+              <a:t>melhor</a:t>
+            </a:r>
+            <a:r>
+              <a:rPr lang="de-DE" sz="2800" i="0" dirty="0"/>
+              <a:t> </a:t>
+            </a:r>
+            <a:r>
+              <a:rPr lang="de-DE" sz="2800" i="0" dirty="0" err="1"/>
+              <a:t>visibilidade</a:t>
             </a:r>
             <a:r>
               <a:rPr lang="de-DE" sz="2800" i="0" dirty="0"/>
@@ -5981,25 +6172,7 @@
             </a:r>
             <a:r>
               <a:rPr lang="de-DE" sz="2800" i="0" dirty="0" err="1"/>
-              <a:t>funcionamento</a:t>
-            </a:r>
-            <a:r>
-              <a:rPr lang="de-DE" sz="2800" i="0" dirty="0"/>
-              <a:t> de um </a:t>
-            </a:r>
-            <a:r>
-              <a:rPr lang="de-DE" sz="2800" i="0" dirty="0" err="1"/>
-              <a:t>processador</a:t>
-            </a:r>
-          </a:p>
-          <a:p>
-            <a:pPr marL="457200" indent="-457200" algn="l">
-              <a:buFont typeface="Arial"/>
-              <a:buChar char="•"/>
-            </a:pPr>
-            <a:r>
-              <a:rPr lang="de-DE" sz="2800" i="0" dirty="0" err="1"/>
-              <a:t>Responsável</a:t>
+              <a:t>diagrama</a:t>
             </a:r>
             <a:r>
               <a:rPr lang="de-DE" sz="2800" i="0" dirty="0"/>
@@ -6007,7 +6180,7 @@
             </a:r>
             <a:r>
               <a:rPr lang="de-DE" sz="2800" i="0" dirty="0" err="1"/>
-              <a:t>pelas</a:t>
+              <a:t>será</a:t>
             </a:r>
             <a:r>
               <a:rPr lang="de-DE" sz="2800" i="0" dirty="0"/>
@@ -6015,1130 +6188,39 @@
             </a:r>
             <a:r>
               <a:rPr lang="de-DE" sz="2800" i="0" dirty="0" err="1"/>
-              <a:t>instruções</a:t>
-            </a:r>
-          </a:p>
-          <a:p>
-            <a:pPr marL="457200" indent="-457200" algn="l">
-              <a:buFont typeface="Arial"/>
-              <a:buChar char="•"/>
-            </a:pPr>
-            <a:endParaRPr lang="de-DE" sz="2800" i="0" dirty="0"/>
+              <a:t>aberto</a:t>
+            </a:r>
+            <a:r>
+              <a:rPr lang="de-DE" sz="2800" i="0" dirty="0"/>
+              <a:t> </a:t>
+            </a:r>
+            <a:r>
+              <a:rPr lang="de-DE" sz="2800" i="0" dirty="0" err="1"/>
+              <a:t>em</a:t>
+            </a:r>
+            <a:r>
+              <a:rPr lang="de-DE" sz="2800" i="0" dirty="0"/>
+              <a:t> um </a:t>
+            </a:r>
+            <a:r>
+              <a:rPr lang="de-DE" sz="2800" i="0" dirty="0" err="1"/>
+              <a:t>arquivo</a:t>
+            </a:r>
+            <a:r>
+              <a:rPr lang="de-DE" sz="2800" i="0" dirty="0"/>
+              <a:t> </a:t>
+            </a:r>
+            <a:r>
+              <a:rPr lang="de-DE" sz="2800" i="0" dirty="0" err="1"/>
+              <a:t>separado</a:t>
+            </a:r>
           </a:p>
         </p:txBody>
       </p:sp>
     </p:spTree>
     <p:extLst>
       <p:ext uri="{BB962C8B-B14F-4D97-AF65-F5344CB8AC3E}">
-        <p14:creationId xmlns:p14="http://schemas.microsoft.com/office/powerpoint/2010/main" val="772748453"/>
-      </p:ext>
-    </p:extLst>
-  </p:cSld>
-  <p:clrMapOvr>
-    <a:masterClrMapping/>
-  </p:clrMapOvr>
-</p:sld>
-</file>
-
-<file path=ppt/slides/slide7.xml><?xml version="1.0" encoding="utf-8"?>
-<p:sld xmlns:a="http://schemas.openxmlformats.org/drawingml/2006/main" xmlns:r="http://schemas.openxmlformats.org/officeDocument/2006/relationships" xmlns:p="http://schemas.openxmlformats.org/presentationml/2006/main">
-  <p:cSld>
-    <p:bg>
-      <p:bgPr>
-        <a:solidFill>
-          <a:schemeClr val="bg1"/>
-        </a:solidFill>
-        <a:effectLst/>
-      </p:bgPr>
-    </p:bg>
-    <p:spTree>
-      <p:nvGrpSpPr>
-        <p:cNvPr id="1" name=""/>
-        <p:cNvGrpSpPr/>
-        <p:nvPr/>
-      </p:nvGrpSpPr>
-      <p:grpSpPr>
-        <a:xfrm>
-          <a:off x="0" y="0"/>
-          <a:ext cx="0" cy="0"/>
-          <a:chOff x="0" y="0"/>
-          <a:chExt cx="0" cy="0"/>
-        </a:xfrm>
-      </p:grpSpPr>
-      <p:sp useBgFill="1">
-        <p:nvSpPr>
-          <p:cNvPr id="8" name="Rectangle 7">
-            <a:extLst>
-              <a:ext uri="{FF2B5EF4-FFF2-40B4-BE49-F238E27FC236}">
-                <a16:creationId xmlns:a16="http://schemas.microsoft.com/office/drawing/2014/main" id="{99485AE2-6BE9-4DCA-A6C4-83F4EEFCCCC0}"/>
-              </a:ext>
-              <a:ext uri="{C183D7F6-B498-43B3-948B-1728B52AA6E4}">
-                <adec:decorative xmlns:adec="http://schemas.microsoft.com/office/drawing/2017/decorative" val="1"/>
-              </a:ext>
-            </a:extLst>
-          </p:cNvPr>
-          <p:cNvSpPr>
-            <a:spLocks noGrp="1" noRot="1" noChangeAspect="1" noMove="1" noResize="1" noEditPoints="1" noAdjustHandles="1" noChangeArrowheads="1" noChangeShapeType="1" noTextEdit="1"/>
-          </p:cNvSpPr>
-          <p:nvPr>
-            <p:extLst>
-              <p:ext uri="{386F3935-93C4-4BCD-93E2-E3B085C9AB24}">
-                <p16:designElem xmlns:p16="http://schemas.microsoft.com/office/powerpoint/2015/main" val="1"/>
-              </p:ext>
-            </p:extLst>
-          </p:nvPr>
-        </p:nvSpPr>
-        <p:spPr>
-          <a:xfrm>
-            <a:off x="0" y="0"/>
-            <a:ext cx="12192000" cy="6858000"/>
-          </a:xfrm>
-          <a:prstGeom prst="rect">
-            <a:avLst/>
-          </a:prstGeom>
-          <a:ln w="12700" cap="flat" cmpd="sng" algn="ctr">
-            <a:noFill/>
-            <a:prstDash val="solid"/>
-            <a:miter lim="800000"/>
-          </a:ln>
-          <a:effectLst/>
-          <a:extLst>
-            <a:ext uri="{91240B29-F687-4F45-9708-019B960494DF}">
-              <a14:hiddenLine xmlns:a14="http://schemas.microsoft.com/office/drawing/2010/main" w="12700" cap="flat" cmpd="sng" algn="ctr">
-                <a:solidFill>
-                  <a:schemeClr val="accent1">
-                    <a:shade val="50000"/>
-                  </a:schemeClr>
-                </a:solidFill>
-                <a:prstDash val="solid"/>
-                <a:miter lim="800000"/>
-              </a14:hiddenLine>
-            </a:ext>
-          </a:extLst>
-        </p:spPr>
-        <p:style>
-          <a:lnRef idx="2">
-            <a:schemeClr val="accent1">
-              <a:shade val="50000"/>
-            </a:schemeClr>
-          </a:lnRef>
-          <a:fillRef idx="1">
-            <a:schemeClr val="accent1"/>
-          </a:fillRef>
-          <a:effectRef idx="0">
-            <a:schemeClr val="accent1"/>
-          </a:effectRef>
-          <a:fontRef idx="minor">
-            <a:schemeClr val="lt1"/>
-          </a:fontRef>
-        </p:style>
-        <p:txBody>
-          <a:bodyPr rtlCol="0" anchor="ctr"/>
-          <a:lstStyle/>
-          <a:p>
-            <a:pPr algn="ctr"/>
-            <a:endParaRPr lang="en-US"/>
-          </a:p>
-        </p:txBody>
-      </p:sp>
-      <p:sp>
-        <p:nvSpPr>
-          <p:cNvPr id="10" name="Rectangle 9">
-            <a:extLst>
-              <a:ext uri="{FF2B5EF4-FFF2-40B4-BE49-F238E27FC236}">
-                <a16:creationId xmlns:a16="http://schemas.microsoft.com/office/drawing/2014/main" id="{65BA7CAF-5EE9-4EEE-9E12-B2CECCB94D62}"/>
-              </a:ext>
-              <a:ext uri="{C183D7F6-B498-43B3-948B-1728B52AA6E4}">
-                <adec:decorative xmlns:adec="http://schemas.microsoft.com/office/drawing/2017/decorative" val="1"/>
-              </a:ext>
-            </a:extLst>
-          </p:cNvPr>
-          <p:cNvSpPr>
-            <a:spLocks noGrp="1" noRot="1" noChangeAspect="1" noMove="1" noResize="1" noEditPoints="1" noAdjustHandles="1" noChangeArrowheads="1" noChangeShapeType="1" noTextEdit="1"/>
-          </p:cNvSpPr>
-          <p:nvPr>
-            <p:extLst>
-              <p:ext uri="{386F3935-93C4-4BCD-93E2-E3B085C9AB24}">
-                <p16:designElem xmlns:p16="http://schemas.microsoft.com/office/powerpoint/2015/main" val="1"/>
-              </p:ext>
-            </p:extLst>
-          </p:nvPr>
-        </p:nvSpPr>
-        <p:spPr>
-          <a:xfrm>
-            <a:off x="0" y="0"/>
-            <a:ext cx="12192000" cy="6857999"/>
-          </a:xfrm>
-          <a:prstGeom prst="rect">
-            <a:avLst/>
-          </a:prstGeom>
-          <a:solidFill>
-            <a:schemeClr val="tx2">
-              <a:lumMod val="75000"/>
-              <a:lumOff val="25000"/>
-            </a:schemeClr>
-          </a:solidFill>
-          <a:ln>
-            <a:noFill/>
-          </a:ln>
-        </p:spPr>
-        <p:style>
-          <a:lnRef idx="2">
-            <a:schemeClr val="accent1">
-              <a:shade val="50000"/>
-            </a:schemeClr>
-          </a:lnRef>
-          <a:fillRef idx="1">
-            <a:schemeClr val="accent1"/>
-          </a:fillRef>
-          <a:effectRef idx="0">
-            <a:schemeClr val="accent1"/>
-          </a:effectRef>
-          <a:fontRef idx="minor">
-            <a:schemeClr val="lt1"/>
-          </a:fontRef>
-        </p:style>
-        <p:txBody>
-          <a:bodyPr rtlCol="0" anchor="ctr"/>
-          <a:lstStyle/>
-          <a:p>
-            <a:pPr algn="ctr"/>
-            <a:endParaRPr lang="en-US"/>
-          </a:p>
-        </p:txBody>
-      </p:sp>
-      <p:sp useBgFill="1">
-        <p:nvSpPr>
-          <p:cNvPr id="12" name="Rectangle 11">
-            <a:extLst>
-              <a:ext uri="{FF2B5EF4-FFF2-40B4-BE49-F238E27FC236}">
-                <a16:creationId xmlns:a16="http://schemas.microsoft.com/office/drawing/2014/main" id="{EC199F73-795E-469A-AF4B-13FA2C7AB76F}"/>
-              </a:ext>
-              <a:ext uri="{C183D7F6-B498-43B3-948B-1728B52AA6E4}">
-                <adec:decorative xmlns:adec="http://schemas.microsoft.com/office/drawing/2017/decorative" val="1"/>
-              </a:ext>
-            </a:extLst>
-          </p:cNvPr>
-          <p:cNvSpPr>
-            <a:spLocks noGrp="1" noRot="1" noChangeAspect="1" noMove="1" noResize="1" noEditPoints="1" noAdjustHandles="1" noChangeArrowheads="1" noChangeShapeType="1" noTextEdit="1"/>
-          </p:cNvSpPr>
-          <p:nvPr>
-            <p:extLst>
-              <p:ext uri="{386F3935-93C4-4BCD-93E2-E3B085C9AB24}">
-                <p16:designElem xmlns:p16="http://schemas.microsoft.com/office/powerpoint/2015/main" val="1"/>
-              </p:ext>
-            </p:extLst>
-          </p:nvPr>
-        </p:nvSpPr>
-        <p:spPr>
-          <a:xfrm>
-            <a:off x="685799" y="684431"/>
-            <a:ext cx="10820401" cy="5486400"/>
-          </a:xfrm>
-          <a:prstGeom prst="rect">
-            <a:avLst/>
-          </a:prstGeom>
-          <a:ln>
-            <a:noFill/>
-          </a:ln>
-        </p:spPr>
-        <p:style>
-          <a:lnRef idx="2">
-            <a:schemeClr val="accent1">
-              <a:shade val="50000"/>
-            </a:schemeClr>
-          </a:lnRef>
-          <a:fillRef idx="1">
-            <a:schemeClr val="accent1"/>
-          </a:fillRef>
-          <a:effectRef idx="0">
-            <a:schemeClr val="accent1"/>
-          </a:effectRef>
-          <a:fontRef idx="minor">
-            <a:schemeClr val="lt1"/>
-          </a:fontRef>
-        </p:style>
-        <p:txBody>
-          <a:bodyPr rtlCol="0" anchor="ctr"/>
-          <a:lstStyle/>
-          <a:p>
-            <a:pPr algn="ctr"/>
-            <a:endParaRPr lang="en-US"/>
-          </a:p>
-        </p:txBody>
-      </p:sp>
-      <p:sp>
-        <p:nvSpPr>
-          <p:cNvPr id="2" name="Título 1"/>
-          <p:cNvSpPr>
-            <a:spLocks noGrp="1"/>
-          </p:cNvSpPr>
-          <p:nvPr>
-            <p:ph type="ctrTitle"/>
-          </p:nvPr>
-        </p:nvSpPr>
-        <p:spPr>
-          <a:xfrm>
-            <a:off x="2039819" y="-481622"/>
-            <a:ext cx="8115300" cy="2339633"/>
-          </a:xfrm>
-        </p:spPr>
-        <p:txBody>
-          <a:bodyPr anchor="b">
-            <a:normAutofit/>
-          </a:bodyPr>
-          <a:lstStyle/>
-          <a:p>
-            <a:r>
-              <a:rPr lang="de-DE" sz="4000" dirty="0" err="1"/>
-              <a:t>Teclado</a:t>
-            </a:r>
-            <a:endParaRPr lang="pt-BR" dirty="0" err="1"/>
-          </a:p>
-        </p:txBody>
-      </p:sp>
-      <p:sp>
-        <p:nvSpPr>
-          <p:cNvPr id="3" name="Subtítulo 2"/>
-          <p:cNvSpPr>
-            <a:spLocks noGrp="1"/>
-          </p:cNvSpPr>
-          <p:nvPr>
-            <p:ph type="subTitle" idx="1"/>
-          </p:nvPr>
-        </p:nvSpPr>
-        <p:spPr>
-          <a:xfrm>
-            <a:off x="2039819" y="2416565"/>
-            <a:ext cx="8115300" cy="2588445"/>
-          </a:xfrm>
-        </p:spPr>
-        <p:txBody>
-          <a:bodyPr anchor="t">
-            <a:normAutofit/>
-          </a:bodyPr>
-          <a:lstStyle/>
-          <a:p>
-            <a:pPr marL="457200" indent="-457200" algn="l">
-              <a:buFont typeface="Arial"/>
-              <a:buChar char="•"/>
-            </a:pPr>
-            <a:r>
-              <a:rPr lang="de-DE" sz="2800" i="0" dirty="0"/>
-              <a:t>Classe </a:t>
-            </a:r>
-            <a:r>
-              <a:rPr lang="de-DE" sz="2800" i="0" dirty="0" err="1"/>
-              <a:t>que</a:t>
-            </a:r>
-            <a:r>
-              <a:rPr lang="de-DE" sz="2800" i="0" dirty="0"/>
-              <a:t> </a:t>
-            </a:r>
-            <a:r>
-              <a:rPr lang="de-DE" sz="2800" i="0" dirty="0" err="1"/>
-              <a:t>simula</a:t>
-            </a:r>
-            <a:r>
-              <a:rPr lang="de-DE" sz="2800" i="0" dirty="0"/>
-              <a:t> o </a:t>
-            </a:r>
-            <a:r>
-              <a:rPr lang="de-DE" sz="2800" i="0" dirty="0" err="1"/>
-              <a:t>funcionamento</a:t>
-            </a:r>
-            <a:r>
-              <a:rPr lang="de-DE" sz="2800" i="0" dirty="0"/>
-              <a:t> de um </a:t>
-            </a:r>
-            <a:r>
-              <a:rPr lang="de-DE" sz="2800" i="0" dirty="0" err="1"/>
-              <a:t>teclado</a:t>
-            </a:r>
-          </a:p>
-          <a:p>
-            <a:pPr marL="457200" indent="-457200" algn="l">
-              <a:buFont typeface="Arial"/>
-              <a:buChar char="•"/>
-            </a:pPr>
-            <a:r>
-              <a:rPr lang="de-DE" sz="2800" i="0" dirty="0" err="1"/>
-              <a:t>Responsável</a:t>
-            </a:r>
-            <a:r>
-              <a:rPr lang="de-DE" sz="2800" i="0" dirty="0"/>
-              <a:t> </a:t>
-            </a:r>
-            <a:r>
-              <a:rPr lang="de-DE" sz="2800" i="0" dirty="0" err="1"/>
-              <a:t>por</a:t>
-            </a:r>
-            <a:r>
-              <a:rPr lang="de-DE" sz="2800" i="0" dirty="0"/>
-              <a:t> </a:t>
-            </a:r>
-            <a:r>
-              <a:rPr lang="de-DE" sz="2800" i="0" dirty="0" err="1"/>
-              <a:t>ler</a:t>
-            </a:r>
-            <a:r>
-              <a:rPr lang="de-DE" sz="2800" i="0" dirty="0"/>
-              <a:t> </a:t>
-            </a:r>
-            <a:r>
-              <a:rPr lang="de-DE" sz="2800" i="0" dirty="0" err="1"/>
-              <a:t>mensagens</a:t>
-            </a:r>
-            <a:r>
-              <a:rPr lang="de-DE" sz="2800" i="0" dirty="0"/>
-              <a:t> </a:t>
-            </a:r>
-            <a:r>
-              <a:rPr lang="de-DE" sz="2800" i="0" dirty="0" err="1"/>
-              <a:t>feitas</a:t>
-            </a:r>
-            <a:r>
-              <a:rPr lang="de-DE" sz="2800" i="0" dirty="0"/>
-              <a:t> </a:t>
-            </a:r>
-            <a:r>
-              <a:rPr lang="de-DE" sz="2800" i="0" dirty="0" err="1"/>
-              <a:t>pelo</a:t>
-            </a:r>
-            <a:r>
-              <a:rPr lang="de-DE" sz="2800" i="0" dirty="0"/>
-              <a:t> </a:t>
-            </a:r>
-            <a:r>
-              <a:rPr lang="de-DE" sz="2800" i="0" dirty="0" err="1"/>
-              <a:t>usuário</a:t>
-            </a:r>
-          </a:p>
-        </p:txBody>
-      </p:sp>
-    </p:spTree>
-    <p:extLst>
-      <p:ext uri="{BB962C8B-B14F-4D97-AF65-F5344CB8AC3E}">
-        <p14:creationId xmlns:p14="http://schemas.microsoft.com/office/powerpoint/2010/main" val="823313417"/>
-      </p:ext>
-    </p:extLst>
-  </p:cSld>
-  <p:clrMapOvr>
-    <a:masterClrMapping/>
-  </p:clrMapOvr>
-</p:sld>
-</file>
-
-<file path=ppt/slides/slide8.xml><?xml version="1.0" encoding="utf-8"?>
-<p:sld xmlns:a="http://schemas.openxmlformats.org/drawingml/2006/main" xmlns:r="http://schemas.openxmlformats.org/officeDocument/2006/relationships" xmlns:p="http://schemas.openxmlformats.org/presentationml/2006/main">
-  <p:cSld>
-    <p:bg>
-      <p:bgPr>
-        <a:solidFill>
-          <a:schemeClr val="bg1"/>
-        </a:solidFill>
-        <a:effectLst/>
-      </p:bgPr>
-    </p:bg>
-    <p:spTree>
-      <p:nvGrpSpPr>
-        <p:cNvPr id="1" name=""/>
-        <p:cNvGrpSpPr/>
-        <p:nvPr/>
-      </p:nvGrpSpPr>
-      <p:grpSpPr>
-        <a:xfrm>
-          <a:off x="0" y="0"/>
-          <a:ext cx="0" cy="0"/>
-          <a:chOff x="0" y="0"/>
-          <a:chExt cx="0" cy="0"/>
-        </a:xfrm>
-      </p:grpSpPr>
-      <p:sp useBgFill="1">
-        <p:nvSpPr>
-          <p:cNvPr id="8" name="Rectangle 7">
-            <a:extLst>
-              <a:ext uri="{FF2B5EF4-FFF2-40B4-BE49-F238E27FC236}">
-                <a16:creationId xmlns:a16="http://schemas.microsoft.com/office/drawing/2014/main" id="{99485AE2-6BE9-4DCA-A6C4-83F4EEFCCCC0}"/>
-              </a:ext>
-              <a:ext uri="{C183D7F6-B498-43B3-948B-1728B52AA6E4}">
-                <adec:decorative xmlns:adec="http://schemas.microsoft.com/office/drawing/2017/decorative" val="1"/>
-              </a:ext>
-            </a:extLst>
-          </p:cNvPr>
-          <p:cNvSpPr>
-            <a:spLocks noGrp="1" noRot="1" noChangeAspect="1" noMove="1" noResize="1" noEditPoints="1" noAdjustHandles="1" noChangeArrowheads="1" noChangeShapeType="1" noTextEdit="1"/>
-          </p:cNvSpPr>
-          <p:nvPr>
-            <p:extLst>
-              <p:ext uri="{386F3935-93C4-4BCD-93E2-E3B085C9AB24}">
-                <p16:designElem xmlns:p16="http://schemas.microsoft.com/office/powerpoint/2015/main" val="1"/>
-              </p:ext>
-            </p:extLst>
-          </p:nvPr>
-        </p:nvSpPr>
-        <p:spPr>
-          <a:xfrm>
-            <a:off x="0" y="0"/>
-            <a:ext cx="12192000" cy="6858000"/>
-          </a:xfrm>
-          <a:prstGeom prst="rect">
-            <a:avLst/>
-          </a:prstGeom>
-          <a:ln w="12700" cap="flat" cmpd="sng" algn="ctr">
-            <a:noFill/>
-            <a:prstDash val="solid"/>
-            <a:miter lim="800000"/>
-          </a:ln>
-          <a:effectLst/>
-          <a:extLst>
-            <a:ext uri="{91240B29-F687-4F45-9708-019B960494DF}">
-              <a14:hiddenLine xmlns:a14="http://schemas.microsoft.com/office/drawing/2010/main" w="12700" cap="flat" cmpd="sng" algn="ctr">
-                <a:solidFill>
-                  <a:schemeClr val="accent1">
-                    <a:shade val="50000"/>
-                  </a:schemeClr>
-                </a:solidFill>
-                <a:prstDash val="solid"/>
-                <a:miter lim="800000"/>
-              </a14:hiddenLine>
-            </a:ext>
-          </a:extLst>
-        </p:spPr>
-        <p:style>
-          <a:lnRef idx="2">
-            <a:schemeClr val="accent1">
-              <a:shade val="50000"/>
-            </a:schemeClr>
-          </a:lnRef>
-          <a:fillRef idx="1">
-            <a:schemeClr val="accent1"/>
-          </a:fillRef>
-          <a:effectRef idx="0">
-            <a:schemeClr val="accent1"/>
-          </a:effectRef>
-          <a:fontRef idx="minor">
-            <a:schemeClr val="lt1"/>
-          </a:fontRef>
-        </p:style>
-        <p:txBody>
-          <a:bodyPr rtlCol="0" anchor="ctr"/>
-          <a:lstStyle/>
-          <a:p>
-            <a:pPr algn="ctr"/>
-            <a:endParaRPr lang="en-US"/>
-          </a:p>
-        </p:txBody>
-      </p:sp>
-      <p:sp>
-        <p:nvSpPr>
-          <p:cNvPr id="10" name="Rectangle 9">
-            <a:extLst>
-              <a:ext uri="{FF2B5EF4-FFF2-40B4-BE49-F238E27FC236}">
-                <a16:creationId xmlns:a16="http://schemas.microsoft.com/office/drawing/2014/main" id="{65BA7CAF-5EE9-4EEE-9E12-B2CECCB94D62}"/>
-              </a:ext>
-              <a:ext uri="{C183D7F6-B498-43B3-948B-1728B52AA6E4}">
-                <adec:decorative xmlns:adec="http://schemas.microsoft.com/office/drawing/2017/decorative" val="1"/>
-              </a:ext>
-            </a:extLst>
-          </p:cNvPr>
-          <p:cNvSpPr>
-            <a:spLocks noGrp="1" noRot="1" noChangeAspect="1" noMove="1" noResize="1" noEditPoints="1" noAdjustHandles="1" noChangeArrowheads="1" noChangeShapeType="1" noTextEdit="1"/>
-          </p:cNvSpPr>
-          <p:nvPr>
-            <p:extLst>
-              <p:ext uri="{386F3935-93C4-4BCD-93E2-E3B085C9AB24}">
-                <p16:designElem xmlns:p16="http://schemas.microsoft.com/office/powerpoint/2015/main" val="1"/>
-              </p:ext>
-            </p:extLst>
-          </p:nvPr>
-        </p:nvSpPr>
-        <p:spPr>
-          <a:xfrm>
-            <a:off x="0" y="0"/>
-            <a:ext cx="12192000" cy="6857999"/>
-          </a:xfrm>
-          <a:prstGeom prst="rect">
-            <a:avLst/>
-          </a:prstGeom>
-          <a:solidFill>
-            <a:schemeClr val="tx2">
-              <a:lumMod val="75000"/>
-              <a:lumOff val="25000"/>
-            </a:schemeClr>
-          </a:solidFill>
-          <a:ln>
-            <a:noFill/>
-          </a:ln>
-        </p:spPr>
-        <p:style>
-          <a:lnRef idx="2">
-            <a:schemeClr val="accent1">
-              <a:shade val="50000"/>
-            </a:schemeClr>
-          </a:lnRef>
-          <a:fillRef idx="1">
-            <a:schemeClr val="accent1"/>
-          </a:fillRef>
-          <a:effectRef idx="0">
-            <a:schemeClr val="accent1"/>
-          </a:effectRef>
-          <a:fontRef idx="minor">
-            <a:schemeClr val="lt1"/>
-          </a:fontRef>
-        </p:style>
-        <p:txBody>
-          <a:bodyPr rtlCol="0" anchor="ctr"/>
-          <a:lstStyle/>
-          <a:p>
-            <a:pPr algn="ctr"/>
-            <a:endParaRPr lang="en-US"/>
-          </a:p>
-        </p:txBody>
-      </p:sp>
-      <p:sp useBgFill="1">
-        <p:nvSpPr>
-          <p:cNvPr id="12" name="Rectangle 11">
-            <a:extLst>
-              <a:ext uri="{FF2B5EF4-FFF2-40B4-BE49-F238E27FC236}">
-                <a16:creationId xmlns:a16="http://schemas.microsoft.com/office/drawing/2014/main" id="{EC199F73-795E-469A-AF4B-13FA2C7AB76F}"/>
-              </a:ext>
-              <a:ext uri="{C183D7F6-B498-43B3-948B-1728B52AA6E4}">
-                <adec:decorative xmlns:adec="http://schemas.microsoft.com/office/drawing/2017/decorative" val="1"/>
-              </a:ext>
-            </a:extLst>
-          </p:cNvPr>
-          <p:cNvSpPr>
-            <a:spLocks noGrp="1" noRot="1" noChangeAspect="1" noMove="1" noResize="1" noEditPoints="1" noAdjustHandles="1" noChangeArrowheads="1" noChangeShapeType="1" noTextEdit="1"/>
-          </p:cNvSpPr>
-          <p:nvPr>
-            <p:extLst>
-              <p:ext uri="{386F3935-93C4-4BCD-93E2-E3B085C9AB24}">
-                <p16:designElem xmlns:p16="http://schemas.microsoft.com/office/powerpoint/2015/main" val="1"/>
-              </p:ext>
-            </p:extLst>
-          </p:nvPr>
-        </p:nvSpPr>
-        <p:spPr>
-          <a:xfrm>
-            <a:off x="685799" y="684431"/>
-            <a:ext cx="10820401" cy="5486400"/>
-          </a:xfrm>
-          <a:prstGeom prst="rect">
-            <a:avLst/>
-          </a:prstGeom>
-          <a:ln>
-            <a:noFill/>
-          </a:ln>
-        </p:spPr>
-        <p:style>
-          <a:lnRef idx="2">
-            <a:schemeClr val="accent1">
-              <a:shade val="50000"/>
-            </a:schemeClr>
-          </a:lnRef>
-          <a:fillRef idx="1">
-            <a:schemeClr val="accent1"/>
-          </a:fillRef>
-          <a:effectRef idx="0">
-            <a:schemeClr val="accent1"/>
-          </a:effectRef>
-          <a:fontRef idx="minor">
-            <a:schemeClr val="lt1"/>
-          </a:fontRef>
-        </p:style>
-        <p:txBody>
-          <a:bodyPr rtlCol="0" anchor="ctr"/>
-          <a:lstStyle/>
-          <a:p>
-            <a:pPr algn="ctr"/>
-            <a:endParaRPr lang="en-US"/>
-          </a:p>
-        </p:txBody>
-      </p:sp>
-      <p:sp>
-        <p:nvSpPr>
-          <p:cNvPr id="2" name="Título 1"/>
-          <p:cNvSpPr>
-            <a:spLocks noGrp="1"/>
-          </p:cNvSpPr>
-          <p:nvPr>
-            <p:ph type="ctrTitle"/>
-          </p:nvPr>
-        </p:nvSpPr>
-        <p:spPr>
-          <a:xfrm>
-            <a:off x="2039819" y="-481622"/>
-            <a:ext cx="8115300" cy="2339633"/>
-          </a:xfrm>
-        </p:spPr>
-        <p:txBody>
-          <a:bodyPr anchor="b">
-            <a:normAutofit/>
-          </a:bodyPr>
-          <a:lstStyle/>
-          <a:p>
-            <a:r>
-              <a:rPr lang="de-DE" sz="4000" dirty="0" err="1"/>
-              <a:t>Leitorconfig</a:t>
-            </a:r>
-            <a:endParaRPr lang="pt-BR" dirty="0" err="1"/>
-          </a:p>
-        </p:txBody>
-      </p:sp>
-      <p:sp>
-        <p:nvSpPr>
-          <p:cNvPr id="3" name="Subtítulo 2"/>
-          <p:cNvSpPr>
-            <a:spLocks noGrp="1"/>
-          </p:cNvSpPr>
-          <p:nvPr>
-            <p:ph type="subTitle" idx="1"/>
-          </p:nvPr>
-        </p:nvSpPr>
-        <p:spPr>
-          <a:xfrm>
-            <a:off x="2039819" y="2416565"/>
-            <a:ext cx="8115300" cy="2588445"/>
-          </a:xfrm>
-        </p:spPr>
-        <p:txBody>
-          <a:bodyPr anchor="t">
-            <a:normAutofit/>
-          </a:bodyPr>
-          <a:lstStyle/>
-          <a:p>
-            <a:pPr marL="457200" indent="-457200" algn="l">
-              <a:buFont typeface="Arial"/>
-              <a:buChar char="•"/>
-            </a:pPr>
-            <a:r>
-              <a:rPr lang="de-DE" sz="2800" i="0" dirty="0"/>
-              <a:t>Classe </a:t>
-            </a:r>
-            <a:r>
-              <a:rPr lang="de-DE" sz="2800" i="0" dirty="0" err="1"/>
-              <a:t>que</a:t>
-            </a:r>
-            <a:r>
-              <a:rPr lang="de-DE" sz="2800" i="0" dirty="0"/>
-              <a:t> </a:t>
-            </a:r>
-            <a:r>
-              <a:rPr lang="de-DE" sz="2800" i="0" dirty="0" err="1"/>
-              <a:t>faz</a:t>
-            </a:r>
-            <a:r>
-              <a:rPr lang="de-DE" sz="2800" i="0" dirty="0"/>
-              <a:t> a </a:t>
-            </a:r>
-            <a:r>
-              <a:rPr lang="de-DE" sz="2800" i="0" dirty="0" err="1"/>
-              <a:t>leitura</a:t>
-            </a:r>
-            <a:r>
-              <a:rPr lang="de-DE" sz="2800" i="0" dirty="0"/>
-              <a:t> do </a:t>
-            </a:r>
-            <a:r>
-              <a:rPr lang="de-DE" sz="2800" i="0" dirty="0" err="1"/>
-              <a:t>arquivo</a:t>
-            </a:r>
-            <a:r>
-              <a:rPr lang="de-DE" sz="2800" i="0" dirty="0"/>
-              <a:t> de </a:t>
-            </a:r>
-            <a:r>
-              <a:rPr lang="de-DE" sz="2800" i="0" dirty="0" err="1"/>
-              <a:t>configuração</a:t>
-            </a:r>
-          </a:p>
-          <a:p>
-            <a:pPr marL="457200" indent="-457200" algn="l">
-              <a:buFont typeface="Arial"/>
-              <a:buChar char="•"/>
-            </a:pPr>
-            <a:r>
-              <a:rPr lang="de-DE" sz="2800" i="0" dirty="0" err="1"/>
-              <a:t>Reponsável</a:t>
-            </a:r>
-            <a:r>
-              <a:rPr lang="de-DE" sz="2800" i="0" dirty="0"/>
-              <a:t> </a:t>
-            </a:r>
-            <a:r>
-              <a:rPr lang="de-DE" sz="2800" i="0" dirty="0" err="1"/>
-              <a:t>também</a:t>
-            </a:r>
-            <a:r>
-              <a:rPr lang="de-DE" sz="2800" i="0" dirty="0"/>
-              <a:t> </a:t>
-            </a:r>
-            <a:r>
-              <a:rPr lang="de-DE" sz="2800" i="0" dirty="0" err="1"/>
-              <a:t>por</a:t>
-            </a:r>
-            <a:r>
-              <a:rPr lang="de-DE" sz="2800" i="0" dirty="0"/>
-              <a:t> </a:t>
-            </a:r>
-            <a:r>
-              <a:rPr lang="de-DE" sz="2800" i="0" dirty="0" err="1"/>
-              <a:t>montar</a:t>
-            </a:r>
-            <a:r>
-              <a:rPr lang="de-DE" sz="2800" i="0" dirty="0"/>
-              <a:t> o </a:t>
-            </a:r>
-            <a:r>
-              <a:rPr lang="de-DE" sz="2800" i="0" dirty="0" err="1"/>
-              <a:t>computador</a:t>
-            </a:r>
-          </a:p>
-        </p:txBody>
-      </p:sp>
-    </p:spTree>
-    <p:extLst>
-      <p:ext uri="{BB962C8B-B14F-4D97-AF65-F5344CB8AC3E}">
-        <p14:creationId xmlns:p14="http://schemas.microsoft.com/office/powerpoint/2010/main" val="1057490945"/>
-      </p:ext>
-    </p:extLst>
-  </p:cSld>
-  <p:clrMapOvr>
-    <a:masterClrMapping/>
-  </p:clrMapOvr>
-</p:sld>
-</file>
-
-<file path=ppt/slides/slide9.xml><?xml version="1.0" encoding="utf-8"?>
-<p:sld xmlns:a="http://schemas.openxmlformats.org/drawingml/2006/main" xmlns:r="http://schemas.openxmlformats.org/officeDocument/2006/relationships" xmlns:p="http://schemas.openxmlformats.org/presentationml/2006/main">
-  <p:cSld>
-    <p:bg>
-      <p:bgPr>
-        <a:solidFill>
-          <a:schemeClr val="bg1"/>
-        </a:solidFill>
-        <a:effectLst/>
-      </p:bgPr>
-    </p:bg>
-    <p:spTree>
-      <p:nvGrpSpPr>
-        <p:cNvPr id="1" name=""/>
-        <p:cNvGrpSpPr/>
-        <p:nvPr/>
-      </p:nvGrpSpPr>
-      <p:grpSpPr>
-        <a:xfrm>
-          <a:off x="0" y="0"/>
-          <a:ext cx="0" cy="0"/>
-          <a:chOff x="0" y="0"/>
-          <a:chExt cx="0" cy="0"/>
-        </a:xfrm>
-      </p:grpSpPr>
-      <p:sp useBgFill="1">
-        <p:nvSpPr>
-          <p:cNvPr id="8" name="Rectangle 7">
-            <a:extLst>
-              <a:ext uri="{FF2B5EF4-FFF2-40B4-BE49-F238E27FC236}">
-                <a16:creationId xmlns:a16="http://schemas.microsoft.com/office/drawing/2014/main" id="{99485AE2-6BE9-4DCA-A6C4-83F4EEFCCCC0}"/>
-              </a:ext>
-              <a:ext uri="{C183D7F6-B498-43B3-948B-1728B52AA6E4}">
-                <adec:decorative xmlns:adec="http://schemas.microsoft.com/office/drawing/2017/decorative" val="1"/>
-              </a:ext>
-            </a:extLst>
-          </p:cNvPr>
-          <p:cNvSpPr>
-            <a:spLocks noGrp="1" noRot="1" noChangeAspect="1" noMove="1" noResize="1" noEditPoints="1" noAdjustHandles="1" noChangeArrowheads="1" noChangeShapeType="1" noTextEdit="1"/>
-          </p:cNvSpPr>
-          <p:nvPr>
-            <p:extLst>
-              <p:ext uri="{386F3935-93C4-4BCD-93E2-E3B085C9AB24}">
-                <p16:designElem xmlns:p16="http://schemas.microsoft.com/office/powerpoint/2015/main" val="1"/>
-              </p:ext>
-            </p:extLst>
-          </p:nvPr>
-        </p:nvSpPr>
-        <p:spPr>
-          <a:xfrm>
-            <a:off x="0" y="0"/>
-            <a:ext cx="12192000" cy="6858000"/>
-          </a:xfrm>
-          <a:prstGeom prst="rect">
-            <a:avLst/>
-          </a:prstGeom>
-          <a:ln w="12700" cap="flat" cmpd="sng" algn="ctr">
-            <a:noFill/>
-            <a:prstDash val="solid"/>
-            <a:miter lim="800000"/>
-          </a:ln>
-          <a:effectLst/>
-          <a:extLst>
-            <a:ext uri="{91240B29-F687-4F45-9708-019B960494DF}">
-              <a14:hiddenLine xmlns:a14="http://schemas.microsoft.com/office/drawing/2010/main" w="12700" cap="flat" cmpd="sng" algn="ctr">
-                <a:solidFill>
-                  <a:schemeClr val="accent1">
-                    <a:shade val="50000"/>
-                  </a:schemeClr>
-                </a:solidFill>
-                <a:prstDash val="solid"/>
-                <a:miter lim="800000"/>
-              </a14:hiddenLine>
-            </a:ext>
-          </a:extLst>
-        </p:spPr>
-        <p:style>
-          <a:lnRef idx="2">
-            <a:schemeClr val="accent1">
-              <a:shade val="50000"/>
-            </a:schemeClr>
-          </a:lnRef>
-          <a:fillRef idx="1">
-            <a:schemeClr val="accent1"/>
-          </a:fillRef>
-          <a:effectRef idx="0">
-            <a:schemeClr val="accent1"/>
-          </a:effectRef>
-          <a:fontRef idx="minor">
-            <a:schemeClr val="lt1"/>
-          </a:fontRef>
-        </p:style>
-        <p:txBody>
-          <a:bodyPr rtlCol="0" anchor="ctr"/>
-          <a:lstStyle/>
-          <a:p>
-            <a:pPr algn="ctr"/>
-            <a:endParaRPr lang="en-US"/>
-          </a:p>
-        </p:txBody>
-      </p:sp>
-      <p:sp>
-        <p:nvSpPr>
-          <p:cNvPr id="10" name="Rectangle 9">
-            <a:extLst>
-              <a:ext uri="{FF2B5EF4-FFF2-40B4-BE49-F238E27FC236}">
-                <a16:creationId xmlns:a16="http://schemas.microsoft.com/office/drawing/2014/main" id="{65BA7CAF-5EE9-4EEE-9E12-B2CECCB94D62}"/>
-              </a:ext>
-              <a:ext uri="{C183D7F6-B498-43B3-948B-1728B52AA6E4}">
-                <adec:decorative xmlns:adec="http://schemas.microsoft.com/office/drawing/2017/decorative" val="1"/>
-              </a:ext>
-            </a:extLst>
-          </p:cNvPr>
-          <p:cNvSpPr>
-            <a:spLocks noGrp="1" noRot="1" noChangeAspect="1" noMove="1" noResize="1" noEditPoints="1" noAdjustHandles="1" noChangeArrowheads="1" noChangeShapeType="1" noTextEdit="1"/>
-          </p:cNvSpPr>
-          <p:nvPr>
-            <p:extLst>
-              <p:ext uri="{386F3935-93C4-4BCD-93E2-E3B085C9AB24}">
-                <p16:designElem xmlns:p16="http://schemas.microsoft.com/office/powerpoint/2015/main" val="1"/>
-              </p:ext>
-            </p:extLst>
-          </p:nvPr>
-        </p:nvSpPr>
-        <p:spPr>
-          <a:xfrm>
-            <a:off x="0" y="0"/>
-            <a:ext cx="12192000" cy="6857999"/>
-          </a:xfrm>
-          <a:prstGeom prst="rect">
-            <a:avLst/>
-          </a:prstGeom>
-          <a:solidFill>
-            <a:schemeClr val="tx2">
-              <a:lumMod val="75000"/>
-              <a:lumOff val="25000"/>
-            </a:schemeClr>
-          </a:solidFill>
-          <a:ln>
-            <a:noFill/>
-          </a:ln>
-        </p:spPr>
-        <p:style>
-          <a:lnRef idx="2">
-            <a:schemeClr val="accent1">
-              <a:shade val="50000"/>
-            </a:schemeClr>
-          </a:lnRef>
-          <a:fillRef idx="1">
-            <a:schemeClr val="accent1"/>
-          </a:fillRef>
-          <a:effectRef idx="0">
-            <a:schemeClr val="accent1"/>
-          </a:effectRef>
-          <a:fontRef idx="minor">
-            <a:schemeClr val="lt1"/>
-          </a:fontRef>
-        </p:style>
-        <p:txBody>
-          <a:bodyPr rtlCol="0" anchor="ctr"/>
-          <a:lstStyle/>
-          <a:p>
-            <a:pPr algn="ctr"/>
-            <a:endParaRPr lang="en-US"/>
-          </a:p>
-        </p:txBody>
-      </p:sp>
-      <p:sp useBgFill="1">
-        <p:nvSpPr>
-          <p:cNvPr id="12" name="Rectangle 11">
-            <a:extLst>
-              <a:ext uri="{FF2B5EF4-FFF2-40B4-BE49-F238E27FC236}">
-                <a16:creationId xmlns:a16="http://schemas.microsoft.com/office/drawing/2014/main" id="{EC199F73-795E-469A-AF4B-13FA2C7AB76F}"/>
-              </a:ext>
-              <a:ext uri="{C183D7F6-B498-43B3-948B-1728B52AA6E4}">
-                <adec:decorative xmlns:adec="http://schemas.microsoft.com/office/drawing/2017/decorative" val="1"/>
-              </a:ext>
-            </a:extLst>
-          </p:cNvPr>
-          <p:cNvSpPr>
-            <a:spLocks noGrp="1" noRot="1" noChangeAspect="1" noMove="1" noResize="1" noEditPoints="1" noAdjustHandles="1" noChangeArrowheads="1" noChangeShapeType="1" noTextEdit="1"/>
-          </p:cNvSpPr>
-          <p:nvPr>
-            <p:extLst>
-              <p:ext uri="{386F3935-93C4-4BCD-93E2-E3B085C9AB24}">
-                <p16:designElem xmlns:p16="http://schemas.microsoft.com/office/powerpoint/2015/main" val="1"/>
-              </p:ext>
-            </p:extLst>
-          </p:nvPr>
-        </p:nvSpPr>
-        <p:spPr>
-          <a:xfrm>
-            <a:off x="685799" y="684431"/>
-            <a:ext cx="10820401" cy="5486400"/>
-          </a:xfrm>
-          <a:prstGeom prst="rect">
-            <a:avLst/>
-          </a:prstGeom>
-          <a:ln>
-            <a:noFill/>
-          </a:ln>
-        </p:spPr>
-        <p:style>
-          <a:lnRef idx="2">
-            <a:schemeClr val="accent1">
-              <a:shade val="50000"/>
-            </a:schemeClr>
-          </a:lnRef>
-          <a:fillRef idx="1">
-            <a:schemeClr val="accent1"/>
-          </a:fillRef>
-          <a:effectRef idx="0">
-            <a:schemeClr val="accent1"/>
-          </a:effectRef>
-          <a:fontRef idx="minor">
-            <a:schemeClr val="lt1"/>
-          </a:fontRef>
-        </p:style>
-        <p:txBody>
-          <a:bodyPr rtlCol="0" anchor="ctr"/>
-          <a:lstStyle/>
-          <a:p>
-            <a:pPr algn="ctr"/>
-            <a:endParaRPr lang="en-US"/>
-          </a:p>
-        </p:txBody>
-      </p:sp>
-      <p:sp>
-        <p:nvSpPr>
-          <p:cNvPr id="2" name="Título 1"/>
-          <p:cNvSpPr>
-            <a:spLocks noGrp="1"/>
-          </p:cNvSpPr>
-          <p:nvPr>
-            <p:ph type="ctrTitle"/>
-          </p:nvPr>
-        </p:nvSpPr>
-        <p:spPr>
-          <a:xfrm>
-            <a:off x="2039819" y="-481622"/>
-            <a:ext cx="8115300" cy="2339633"/>
-          </a:xfrm>
-        </p:spPr>
-        <p:txBody>
-          <a:bodyPr anchor="b">
-            <a:normAutofit/>
-          </a:bodyPr>
-          <a:lstStyle/>
-          <a:p>
-            <a:r>
-              <a:rPr lang="de-DE" sz="4000" dirty="0" err="1"/>
-              <a:t>Diagrama</a:t>
-            </a:r>
-            <a:r>
-              <a:rPr lang="de-DE" sz="4000" dirty="0"/>
-              <a:t> de </a:t>
-            </a:r>
-            <a:r>
-              <a:rPr lang="de-DE" sz="4000" dirty="0" err="1"/>
-              <a:t>classe</a:t>
-            </a:r>
-            <a:br>
-              <a:rPr lang="de-DE" sz="4000" dirty="0"/>
-            </a:br>
-            <a:endParaRPr lang="pt-BR" dirty="0" err="1"/>
-          </a:p>
-        </p:txBody>
-      </p:sp>
-      <p:sp>
-        <p:nvSpPr>
-          <p:cNvPr id="3" name="Subtítulo 2"/>
-          <p:cNvSpPr>
-            <a:spLocks noGrp="1"/>
-          </p:cNvSpPr>
-          <p:nvPr>
-            <p:ph type="subTitle" idx="1"/>
-          </p:nvPr>
-        </p:nvSpPr>
-        <p:spPr>
-          <a:xfrm>
-            <a:off x="1759082" y="6707828"/>
-            <a:ext cx="8115300" cy="2588445"/>
-          </a:xfrm>
-        </p:spPr>
-        <p:txBody>
-          <a:bodyPr anchor="t">
-            <a:normAutofit/>
-          </a:bodyPr>
-          <a:lstStyle/>
-          <a:p>
-            <a:pPr algn="l"/>
-            <a:endParaRPr lang="de-DE" sz="2800" i="0" dirty="0"/>
-          </a:p>
-        </p:txBody>
-      </p:sp>
-      <p:pic>
-        <p:nvPicPr>
-          <p:cNvPr id="5" name="Imagem 5" descr="Diagrama&#10;&#10;Descrição gerada automaticamente">
-            <a:extLst>
-              <a:ext uri="{FF2B5EF4-FFF2-40B4-BE49-F238E27FC236}">
-                <a16:creationId xmlns:a16="http://schemas.microsoft.com/office/drawing/2014/main" id="{D8244E16-FD28-4828-ACCE-7DDB871C4D6C}"/>
-              </a:ext>
-            </a:extLst>
-          </p:cNvPr>
-          <p:cNvPicPr>
-            <a:picLocks noChangeAspect="1"/>
-          </p:cNvPicPr>
-          <p:nvPr/>
-        </p:nvPicPr>
-        <p:blipFill>
-          <a:blip r:embed="rId2"/>
-          <a:stretch>
-            <a:fillRect/>
-          </a:stretch>
-        </p:blipFill>
-        <p:spPr>
-          <a:xfrm>
-            <a:off x="4275551" y="1436288"/>
-            <a:ext cx="3891418" cy="4590848"/>
-          </a:xfrm>
-          <a:prstGeom prst="rect">
-            <a:avLst/>
-          </a:prstGeom>
-        </p:spPr>
-      </p:pic>
-    </p:spTree>
-    <p:extLst>
-      <p:ext uri="{BB962C8B-B14F-4D97-AF65-F5344CB8AC3E}">
-        <p14:creationId xmlns:p14="http://schemas.microsoft.com/office/powerpoint/2010/main" val="2450273134"/>
+        <p14:creationId xmlns:p14="http://schemas.microsoft.com/office/powerpoint/2010/main" val="2304958185"/>
       </p:ext>
     </p:extLst>
   </p:cSld>

</xml_diff>